<commit_message>
created adminclient first file and some other folders
</commit_message>
<xml_diff>
--- a/Server/src/Dokumentation/Resourcen.pptx
+++ b/Server/src/Dokumentation/Resourcen.pptx
@@ -4265,6 +4265,455 @@
           </p:txBody>
         </p:sp>
       </p:grpSp>
+      <p:grpSp>
+        <p:nvGrpSpPr>
+          <p:cNvPr id="35" name="Gruppieren 34"/>
+          <p:cNvGrpSpPr/>
+          <p:nvPr/>
+        </p:nvGrpSpPr>
+        <p:grpSpPr>
+          <a:xfrm>
+            <a:off x="755576" y="2276871"/>
+            <a:ext cx="1512168" cy="864097"/>
+            <a:chOff x="5364088" y="408664"/>
+            <a:chExt cx="1512168" cy="912103"/>
+          </a:xfrm>
+        </p:grpSpPr>
+        <p:sp>
+          <p:nvSpPr>
+            <p:cNvPr id="36" name="Rechteck 35"/>
+            <p:cNvSpPr/>
+            <p:nvPr/>
+          </p:nvSpPr>
+          <p:spPr>
+            <a:xfrm>
+              <a:off x="5364088" y="408664"/>
+              <a:ext cx="1512168" cy="212023"/>
+            </a:xfrm>
+            <a:prstGeom prst="rect">
+              <a:avLst/>
+            </a:prstGeom>
+            <a:ln w="6350"/>
+          </p:spPr>
+          <p:style>
+            <a:lnRef idx="2">
+              <a:schemeClr val="dk1"/>
+            </a:lnRef>
+            <a:fillRef idx="1">
+              <a:schemeClr val="lt1"/>
+            </a:fillRef>
+            <a:effectRef idx="0">
+              <a:schemeClr val="dk1"/>
+            </a:effectRef>
+            <a:fontRef idx="minor">
+              <a:schemeClr val="dk1"/>
+            </a:fontRef>
+          </p:style>
+          <p:txBody>
+            <a:bodyPr rtlCol="0" anchor="ctr"/>
+            <a:lstStyle/>
+            <a:p>
+              <a:pPr algn="ctr"/>
+              <a:r>
+                <a:rPr lang="de-DE" sz="1000" smtClean="0"/>
+                <a:t>/</a:t>
+              </a:r>
+              <a:endParaRPr lang="de-DE" sz="1000"/>
+            </a:p>
+          </p:txBody>
+        </p:sp>
+        <p:sp>
+          <p:nvSpPr>
+            <p:cNvPr id="37" name="Rechteck 36"/>
+            <p:cNvSpPr/>
+            <p:nvPr/>
+          </p:nvSpPr>
+          <p:spPr>
+            <a:xfrm>
+              <a:off x="5364088" y="620688"/>
+              <a:ext cx="1512168" cy="700079"/>
+            </a:xfrm>
+            <a:prstGeom prst="rect">
+              <a:avLst/>
+            </a:prstGeom>
+            <a:ln w="6350"/>
+          </p:spPr>
+          <p:style>
+            <a:lnRef idx="2">
+              <a:schemeClr val="dk1"/>
+            </a:lnRef>
+            <a:fillRef idx="1">
+              <a:schemeClr val="lt1"/>
+            </a:fillRef>
+            <a:effectRef idx="0">
+              <a:schemeClr val="dk1"/>
+            </a:effectRef>
+            <a:fontRef idx="minor">
+              <a:schemeClr val="dk1"/>
+            </a:fontRef>
+          </p:style>
+          <p:txBody>
+            <a:bodyPr rtlCol="0" anchor="t"/>
+            <a:lstStyle/>
+            <a:p>
+              <a:r>
+                <a:rPr lang="de-DE" sz="1000" b="1" smtClean="0"/>
+                <a:t>GET</a:t>
+              </a:r>
+              <a:r>
+                <a:rPr lang="de-DE" sz="1000" smtClean="0"/>
+                <a:t>: show main view</a:t>
+              </a:r>
+            </a:p>
+            <a:p>
+              <a:r>
+                <a:rPr lang="de-DE" sz="1000" b="1" smtClean="0"/>
+                <a:t>POST</a:t>
+              </a:r>
+              <a:r>
+                <a:rPr lang="de-DE" sz="1000" smtClean="0"/>
+                <a:t>:</a:t>
+              </a:r>
+            </a:p>
+            <a:p>
+              <a:r>
+                <a:rPr lang="de-DE" sz="1000" b="1" smtClean="0"/>
+                <a:t>PUT</a:t>
+              </a:r>
+              <a:r>
+                <a:rPr lang="de-DE" sz="1000" smtClean="0"/>
+                <a:t>:</a:t>
+              </a:r>
+            </a:p>
+            <a:p>
+              <a:r>
+                <a:rPr lang="de-DE" sz="1000" b="1" smtClean="0"/>
+                <a:t>DELETE</a:t>
+              </a:r>
+              <a:r>
+                <a:rPr lang="de-DE" sz="1000" smtClean="0"/>
+                <a:t>:</a:t>
+              </a:r>
+              <a:endParaRPr lang="de-DE" sz="1000"/>
+            </a:p>
+          </p:txBody>
+        </p:sp>
+      </p:grpSp>
+      <p:cxnSp>
+        <p:nvCxnSpPr>
+          <p:cNvPr id="39" name="Gerade Verbindung mit Pfeil 38"/>
+          <p:cNvCxnSpPr>
+            <a:stCxn id="37" idx="3"/>
+            <a:endCxn id="10" idx="1"/>
+          </p:cNvCxnSpPr>
+          <p:nvPr/>
+        </p:nvCxnSpPr>
+        <p:spPr>
+          <a:xfrm flipV="1">
+            <a:off x="2267744" y="793129"/>
+            <a:ext cx="2232248" cy="2016223"/>
+          </a:xfrm>
+          <a:prstGeom prst="straightConnector1">
+            <a:avLst/>
+          </a:prstGeom>
+          <a:ln>
+            <a:tailEnd type="arrow"/>
+          </a:ln>
+        </p:spPr>
+        <p:style>
+          <a:lnRef idx="1">
+            <a:schemeClr val="accent1"/>
+          </a:lnRef>
+          <a:fillRef idx="0">
+            <a:schemeClr val="accent1"/>
+          </a:fillRef>
+          <a:effectRef idx="0">
+            <a:schemeClr val="accent1"/>
+          </a:effectRef>
+          <a:fontRef idx="minor">
+            <a:schemeClr val="tx1"/>
+          </a:fontRef>
+        </p:style>
+      </p:cxnSp>
+      <p:cxnSp>
+        <p:nvCxnSpPr>
+          <p:cNvPr id="41" name="Gerade Verbindung mit Pfeil 40"/>
+          <p:cNvCxnSpPr>
+            <a:stCxn id="37" idx="3"/>
+            <a:endCxn id="22" idx="1"/>
+          </p:cNvCxnSpPr>
+          <p:nvPr/>
+        </p:nvCxnSpPr>
+        <p:spPr>
+          <a:xfrm flipV="1">
+            <a:off x="2267744" y="1801241"/>
+            <a:ext cx="2232248" cy="1008111"/>
+          </a:xfrm>
+          <a:prstGeom prst="straightConnector1">
+            <a:avLst/>
+          </a:prstGeom>
+          <a:ln>
+            <a:tailEnd type="arrow"/>
+          </a:ln>
+        </p:spPr>
+        <p:style>
+          <a:lnRef idx="1">
+            <a:schemeClr val="accent1"/>
+          </a:lnRef>
+          <a:fillRef idx="0">
+            <a:schemeClr val="accent1"/>
+          </a:fillRef>
+          <a:effectRef idx="0">
+            <a:schemeClr val="accent1"/>
+          </a:effectRef>
+          <a:fontRef idx="minor">
+            <a:schemeClr val="tx1"/>
+          </a:fontRef>
+        </p:style>
+      </p:cxnSp>
+      <p:cxnSp>
+        <p:nvCxnSpPr>
+          <p:cNvPr id="43" name="Gerade Verbindung mit Pfeil 42"/>
+          <p:cNvCxnSpPr>
+            <a:stCxn id="37" idx="3"/>
+            <a:endCxn id="25" idx="1"/>
+          </p:cNvCxnSpPr>
+          <p:nvPr/>
+        </p:nvCxnSpPr>
+        <p:spPr>
+          <a:xfrm>
+            <a:off x="2267744" y="2809352"/>
+            <a:ext cx="2232248" cy="1008112"/>
+          </a:xfrm>
+          <a:prstGeom prst="straightConnector1">
+            <a:avLst/>
+          </a:prstGeom>
+          <a:ln>
+            <a:tailEnd type="arrow"/>
+          </a:ln>
+        </p:spPr>
+        <p:style>
+          <a:lnRef idx="1">
+            <a:schemeClr val="accent1"/>
+          </a:lnRef>
+          <a:fillRef idx="0">
+            <a:schemeClr val="accent1"/>
+          </a:fillRef>
+          <a:effectRef idx="0">
+            <a:schemeClr val="accent1"/>
+          </a:effectRef>
+          <a:fontRef idx="minor">
+            <a:schemeClr val="tx1"/>
+          </a:fontRef>
+        </p:style>
+      </p:cxnSp>
+      <p:cxnSp>
+        <p:nvCxnSpPr>
+          <p:cNvPr id="45" name="Gerade Verbindung mit Pfeil 44"/>
+          <p:cNvCxnSpPr>
+            <a:stCxn id="37" idx="3"/>
+            <a:endCxn id="31" idx="1"/>
+          </p:cNvCxnSpPr>
+          <p:nvPr/>
+        </p:nvCxnSpPr>
+        <p:spPr>
+          <a:xfrm>
+            <a:off x="2267744" y="2809352"/>
+            <a:ext cx="2232248" cy="2016225"/>
+          </a:xfrm>
+          <a:prstGeom prst="straightConnector1">
+            <a:avLst/>
+          </a:prstGeom>
+          <a:ln>
+            <a:tailEnd type="arrow"/>
+          </a:ln>
+        </p:spPr>
+        <p:style>
+          <a:lnRef idx="1">
+            <a:schemeClr val="accent1"/>
+          </a:lnRef>
+          <a:fillRef idx="0">
+            <a:schemeClr val="accent1"/>
+          </a:fillRef>
+          <a:effectRef idx="0">
+            <a:schemeClr val="accent1"/>
+          </a:effectRef>
+          <a:fontRef idx="minor">
+            <a:schemeClr val="tx1"/>
+          </a:fontRef>
+        </p:style>
+      </p:cxnSp>
+      <p:cxnSp>
+        <p:nvCxnSpPr>
+          <p:cNvPr id="47" name="Gerade Verbindung mit Pfeil 46"/>
+          <p:cNvCxnSpPr>
+            <a:stCxn id="37" idx="3"/>
+            <a:endCxn id="19" idx="1"/>
+          </p:cNvCxnSpPr>
+          <p:nvPr/>
+        </p:nvCxnSpPr>
+        <p:spPr>
+          <a:xfrm>
+            <a:off x="2267744" y="2809352"/>
+            <a:ext cx="4104456" cy="1"/>
+          </a:xfrm>
+          <a:prstGeom prst="straightConnector1">
+            <a:avLst/>
+          </a:prstGeom>
+          <a:ln>
+            <a:tailEnd type="arrow"/>
+          </a:ln>
+        </p:spPr>
+        <p:style>
+          <a:lnRef idx="1">
+            <a:schemeClr val="accent1"/>
+          </a:lnRef>
+          <a:fillRef idx="0">
+            <a:schemeClr val="accent1"/>
+          </a:fillRef>
+          <a:effectRef idx="0">
+            <a:schemeClr val="accent1"/>
+          </a:effectRef>
+          <a:fontRef idx="minor">
+            <a:schemeClr val="tx1"/>
+          </a:fontRef>
+        </p:style>
+      </p:cxnSp>
+      <p:cxnSp>
+        <p:nvCxnSpPr>
+          <p:cNvPr id="49" name="Gerade Verbindung mit Pfeil 48"/>
+          <p:cNvCxnSpPr>
+            <a:stCxn id="10" idx="3"/>
+            <a:endCxn id="6" idx="1"/>
+          </p:cNvCxnSpPr>
+          <p:nvPr/>
+        </p:nvCxnSpPr>
+        <p:spPr>
+          <a:xfrm flipV="1">
+            <a:off x="6012160" y="793128"/>
+            <a:ext cx="360040" cy="1"/>
+          </a:xfrm>
+          <a:prstGeom prst="straightConnector1">
+            <a:avLst/>
+          </a:prstGeom>
+          <a:ln>
+            <a:tailEnd type="arrow"/>
+          </a:ln>
+        </p:spPr>
+        <p:style>
+          <a:lnRef idx="1">
+            <a:schemeClr val="accent1"/>
+          </a:lnRef>
+          <a:fillRef idx="0">
+            <a:schemeClr val="accent1"/>
+          </a:fillRef>
+          <a:effectRef idx="0">
+            <a:schemeClr val="accent1"/>
+          </a:effectRef>
+          <a:fontRef idx="minor">
+            <a:schemeClr val="tx1"/>
+          </a:fontRef>
+        </p:style>
+      </p:cxnSp>
+      <p:cxnSp>
+        <p:nvCxnSpPr>
+          <p:cNvPr id="50" name="Gerade Verbindung mit Pfeil 49"/>
+          <p:cNvCxnSpPr/>
+          <p:nvPr/>
+        </p:nvCxnSpPr>
+        <p:spPr>
+          <a:xfrm flipV="1">
+            <a:off x="6012160" y="1772816"/>
+            <a:ext cx="360040" cy="1"/>
+          </a:xfrm>
+          <a:prstGeom prst="straightConnector1">
+            <a:avLst/>
+          </a:prstGeom>
+          <a:ln>
+            <a:tailEnd type="arrow"/>
+          </a:ln>
+        </p:spPr>
+        <p:style>
+          <a:lnRef idx="1">
+            <a:schemeClr val="accent1"/>
+          </a:lnRef>
+          <a:fillRef idx="0">
+            <a:schemeClr val="accent1"/>
+          </a:fillRef>
+          <a:effectRef idx="0">
+            <a:schemeClr val="accent1"/>
+          </a:effectRef>
+          <a:fontRef idx="minor">
+            <a:schemeClr val="tx1"/>
+          </a:fontRef>
+        </p:style>
+      </p:cxnSp>
+      <p:cxnSp>
+        <p:nvCxnSpPr>
+          <p:cNvPr id="51" name="Gerade Verbindung mit Pfeil 50"/>
+          <p:cNvCxnSpPr/>
+          <p:nvPr/>
+        </p:nvCxnSpPr>
+        <p:spPr>
+          <a:xfrm flipV="1">
+            <a:off x="6012160" y="3789040"/>
+            <a:ext cx="360040" cy="1"/>
+          </a:xfrm>
+          <a:prstGeom prst="straightConnector1">
+            <a:avLst/>
+          </a:prstGeom>
+          <a:ln>
+            <a:tailEnd type="arrow"/>
+          </a:ln>
+        </p:spPr>
+        <p:style>
+          <a:lnRef idx="1">
+            <a:schemeClr val="accent1"/>
+          </a:lnRef>
+          <a:fillRef idx="0">
+            <a:schemeClr val="accent1"/>
+          </a:fillRef>
+          <a:effectRef idx="0">
+            <a:schemeClr val="accent1"/>
+          </a:effectRef>
+          <a:fontRef idx="minor">
+            <a:schemeClr val="tx1"/>
+          </a:fontRef>
+        </p:style>
+      </p:cxnSp>
+      <p:cxnSp>
+        <p:nvCxnSpPr>
+          <p:cNvPr id="52" name="Gerade Verbindung mit Pfeil 51"/>
+          <p:cNvCxnSpPr/>
+          <p:nvPr/>
+        </p:nvCxnSpPr>
+        <p:spPr>
+          <a:xfrm flipV="1">
+            <a:off x="6012160" y="4797151"/>
+            <a:ext cx="360040" cy="1"/>
+          </a:xfrm>
+          <a:prstGeom prst="straightConnector1">
+            <a:avLst/>
+          </a:prstGeom>
+          <a:ln>
+            <a:tailEnd type="arrow"/>
+          </a:ln>
+        </p:spPr>
+        <p:style>
+          <a:lnRef idx="1">
+            <a:schemeClr val="accent1"/>
+          </a:lnRef>
+          <a:fillRef idx="0">
+            <a:schemeClr val="accent1"/>
+          </a:fillRef>
+          <a:effectRef idx="0">
+            <a:schemeClr val="accent1"/>
+          </a:effectRef>
+          <a:fontRef idx="minor">
+            <a:schemeClr val="tx1"/>
+          </a:fontRef>
+        </p:style>
+      </p:cxnSp>
     </p:spTree>
   </p:cSld>
   <p:clrMapOvr>

</xml_diff>